<commit_message>
WE ARE PROUD ;)
</commit_message>
<xml_diff>
--- a/documents/presentatie.pptx
+++ b/documents/presentatie.pptx
@@ -5,7 +5,7 @@
     <p:sldMasterId id="2147483648" r:id="rId1"/>
   </p:sldMasterIdLst>
   <p:notesMasterIdLst>
-    <p:notesMasterId r:id="rId12"/>
+    <p:notesMasterId r:id="rId13"/>
   </p:notesMasterIdLst>
   <p:sldIdLst>
     <p:sldId id="288" r:id="rId2"/>
@@ -14,10 +14,11 @@
     <p:sldId id="293" r:id="rId5"/>
     <p:sldId id="294" r:id="rId6"/>
     <p:sldId id="295" r:id="rId7"/>
-    <p:sldId id="287" r:id="rId8"/>
-    <p:sldId id="289" r:id="rId9"/>
-    <p:sldId id="290" r:id="rId10"/>
-    <p:sldId id="291" r:id="rId11"/>
+    <p:sldId id="297" r:id="rId8"/>
+    <p:sldId id="287" r:id="rId9"/>
+    <p:sldId id="289" r:id="rId10"/>
+    <p:sldId id="290" r:id="rId11"/>
+    <p:sldId id="291" r:id="rId12"/>
   </p:sldIdLst>
   <p:sldSz cx="12192000" cy="6858000"/>
   <p:notesSz cx="6858000" cy="9144000"/>
@@ -643,6 +644,90 @@
     </p:spTree>
     <p:extLst>
       <p:ext uri="{BB962C8B-B14F-4D97-AF65-F5344CB8AC3E}">
+        <p14:creationId xmlns:p14="http://schemas.microsoft.com/office/powerpoint/2010/main" val="2900652606"/>
+      </p:ext>
+    </p:extLst>
+  </p:cSld>
+  <p:clrMapOvr>
+    <a:masterClrMapping/>
+  </p:clrMapOvr>
+</p:notes>
+</file>
+
+<file path=ppt/notesSlides/notesSlide11.xml><?xml version="1.0" encoding="utf-8"?>
+<p:notes xmlns:a="http://schemas.openxmlformats.org/drawingml/2006/main" xmlns:r="http://schemas.openxmlformats.org/officeDocument/2006/relationships" xmlns:p="http://schemas.openxmlformats.org/presentationml/2006/main">
+  <p:cSld>
+    <p:spTree>
+      <p:nvGrpSpPr>
+        <p:cNvPr id="1" name=""/>
+        <p:cNvGrpSpPr/>
+        <p:nvPr/>
+      </p:nvGrpSpPr>
+      <p:grpSpPr>
+        <a:xfrm>
+          <a:off x="0" y="0"/>
+          <a:ext cx="0" cy="0"/>
+          <a:chOff x="0" y="0"/>
+          <a:chExt cx="0" cy="0"/>
+        </a:xfrm>
+      </p:grpSpPr>
+      <p:sp>
+        <p:nvSpPr>
+          <p:cNvPr id="2" name="Tijdelijke aanduiding voor dia-afbeelding 1"/>
+          <p:cNvSpPr>
+            <a:spLocks noGrp="1" noRot="1" noChangeAspect="1"/>
+          </p:cNvSpPr>
+          <p:nvPr>
+            <p:ph type="sldImg"/>
+          </p:nvPr>
+        </p:nvSpPr>
+        <p:spPr/>
+      </p:sp>
+      <p:sp>
+        <p:nvSpPr>
+          <p:cNvPr id="3" name="Tijdelijke aanduiding voor notities 2"/>
+          <p:cNvSpPr>
+            <a:spLocks noGrp="1"/>
+          </p:cNvSpPr>
+          <p:nvPr>
+            <p:ph type="body" idx="1"/>
+          </p:nvPr>
+        </p:nvSpPr>
+        <p:spPr/>
+        <p:txBody>
+          <a:bodyPr/>
+          <a:lstStyle/>
+          <a:p>
+            <a:endParaRPr lang="nl-BE" dirty="0"/>
+          </a:p>
+        </p:txBody>
+      </p:sp>
+      <p:sp>
+        <p:nvSpPr>
+          <p:cNvPr id="4" name="Tijdelijke aanduiding voor dianummer 3"/>
+          <p:cNvSpPr>
+            <a:spLocks noGrp="1"/>
+          </p:cNvSpPr>
+          <p:nvPr>
+            <p:ph type="sldNum" sz="quarter" idx="10"/>
+          </p:nvPr>
+        </p:nvSpPr>
+        <p:spPr/>
+        <p:txBody>
+          <a:bodyPr/>
+          <a:lstStyle/>
+          <a:p>
+            <a:fld id="{DED0CC16-5F5B-4BEB-BB12-48327C013F79}" type="slidenum">
+              <a:rPr lang="nl-BE" smtClean="0"/>
+              <a:t>11</a:t>
+            </a:fld>
+            <a:endParaRPr lang="nl-BE"/>
+          </a:p>
+        </p:txBody>
+      </p:sp>
+    </p:spTree>
+    <p:extLst>
+      <p:ext uri="{BB962C8B-B14F-4D97-AF65-F5344CB8AC3E}">
         <p14:creationId xmlns:p14="http://schemas.microsoft.com/office/powerpoint/2010/main" val="1673945405"/>
       </p:ext>
     </p:extLst>
@@ -1147,7 +1232,7 @@
     </p:spTree>
     <p:extLst>
       <p:ext uri="{BB962C8B-B14F-4D97-AF65-F5344CB8AC3E}">
-        <p14:creationId xmlns:p14="http://schemas.microsoft.com/office/powerpoint/2010/main" val="875075753"/>
+        <p14:creationId xmlns:p14="http://schemas.microsoft.com/office/powerpoint/2010/main" val="4251020213"/>
       </p:ext>
     </p:extLst>
   </p:cSld>
@@ -1231,7 +1316,7 @@
     </p:spTree>
     <p:extLst>
       <p:ext uri="{BB962C8B-B14F-4D97-AF65-F5344CB8AC3E}">
-        <p14:creationId xmlns:p14="http://schemas.microsoft.com/office/powerpoint/2010/main" val="2104699543"/>
+        <p14:creationId xmlns:p14="http://schemas.microsoft.com/office/powerpoint/2010/main" val="875075753"/>
       </p:ext>
     </p:extLst>
   </p:cSld>
@@ -1315,7 +1400,7 @@
     </p:spTree>
     <p:extLst>
       <p:ext uri="{BB962C8B-B14F-4D97-AF65-F5344CB8AC3E}">
-        <p14:creationId xmlns:p14="http://schemas.microsoft.com/office/powerpoint/2010/main" val="2900652606"/>
+        <p14:creationId xmlns:p14="http://schemas.microsoft.com/office/powerpoint/2010/main" val="2104699543"/>
       </p:ext>
     </p:extLst>
   </p:cSld>
@@ -5433,6 +5518,471 @@
 </file>
 
 <file path=ppt/slides/slide10.xml><?xml version="1.0" encoding="utf-8"?>
+<p:sld xmlns:a="http://schemas.openxmlformats.org/drawingml/2006/main" xmlns:r="http://schemas.openxmlformats.org/officeDocument/2006/relationships" xmlns:p="http://schemas.openxmlformats.org/presentationml/2006/main">
+  <p:cSld>
+    <p:bg>
+      <p:bgPr>
+        <a:solidFill>
+          <a:schemeClr val="tx1"/>
+        </a:solidFill>
+        <a:effectLst/>
+      </p:bgPr>
+    </p:bg>
+    <p:spTree>
+      <p:nvGrpSpPr>
+        <p:cNvPr id="1" name=""/>
+        <p:cNvGrpSpPr/>
+        <p:nvPr/>
+      </p:nvGrpSpPr>
+      <p:grpSpPr>
+        <a:xfrm>
+          <a:off x="0" y="0"/>
+          <a:ext cx="0" cy="0"/>
+          <a:chOff x="0" y="0"/>
+          <a:chExt cx="0" cy="0"/>
+        </a:xfrm>
+      </p:grpSpPr>
+      <p:sp>
+        <p:nvSpPr>
+          <p:cNvPr id="7" name="Rechthoek 6"/>
+          <p:cNvSpPr/>
+          <p:nvPr/>
+        </p:nvSpPr>
+        <p:spPr>
+          <a:xfrm>
+            <a:off x="716764" y="0"/>
+            <a:ext cx="11472001" cy="720000"/>
+          </a:xfrm>
+          <a:prstGeom prst="rect">
+            <a:avLst/>
+          </a:prstGeom>
+          <a:solidFill>
+            <a:schemeClr val="tx1"/>
+          </a:solidFill>
+          <a:ln w="63500">
+            <a:solidFill>
+              <a:schemeClr val="bg1"/>
+            </a:solidFill>
+          </a:ln>
+        </p:spPr>
+        <p:style>
+          <a:lnRef idx="2">
+            <a:schemeClr val="accent1">
+              <a:shade val="50000"/>
+            </a:schemeClr>
+          </a:lnRef>
+          <a:fillRef idx="1">
+            <a:schemeClr val="accent1"/>
+          </a:fillRef>
+          <a:effectRef idx="0">
+            <a:schemeClr val="accent1"/>
+          </a:effectRef>
+          <a:fontRef idx="minor">
+            <a:schemeClr val="lt1"/>
+          </a:fontRef>
+        </p:style>
+        <p:txBody>
+          <a:bodyPr rtlCol="0" anchor="ctr"/>
+          <a:lstStyle/>
+          <a:p>
+            <a:pPr algn="ctr"/>
+            <a:endParaRPr lang="nl-BE" dirty="0"/>
+          </a:p>
+        </p:txBody>
+      </p:sp>
+      <p:sp>
+        <p:nvSpPr>
+          <p:cNvPr id="8" name="Rechthoek 7"/>
+          <p:cNvSpPr/>
+          <p:nvPr/>
+        </p:nvSpPr>
+        <p:spPr>
+          <a:xfrm rot="5400000">
+            <a:off x="8762999" y="3429001"/>
+            <a:ext cx="6138002" cy="720000"/>
+          </a:xfrm>
+          <a:prstGeom prst="rect">
+            <a:avLst/>
+          </a:prstGeom>
+          <a:solidFill>
+            <a:schemeClr val="tx1"/>
+          </a:solidFill>
+          <a:ln w="63500">
+            <a:solidFill>
+              <a:schemeClr val="bg1"/>
+            </a:solidFill>
+          </a:ln>
+        </p:spPr>
+        <p:style>
+          <a:lnRef idx="2">
+            <a:schemeClr val="accent1">
+              <a:shade val="50000"/>
+            </a:schemeClr>
+          </a:lnRef>
+          <a:fillRef idx="1">
+            <a:schemeClr val="accent1"/>
+          </a:fillRef>
+          <a:effectRef idx="0">
+            <a:schemeClr val="accent1"/>
+          </a:effectRef>
+          <a:fontRef idx="minor">
+            <a:schemeClr val="lt1"/>
+          </a:fontRef>
+        </p:style>
+        <p:txBody>
+          <a:bodyPr rtlCol="0" anchor="ctr"/>
+          <a:lstStyle/>
+          <a:p>
+            <a:pPr algn="ctr"/>
+            <a:endParaRPr lang="nl-BE"/>
+          </a:p>
+        </p:txBody>
+      </p:sp>
+      <p:sp>
+        <p:nvSpPr>
+          <p:cNvPr id="9" name="Rechthoek 8"/>
+          <p:cNvSpPr/>
+          <p:nvPr/>
+        </p:nvSpPr>
+        <p:spPr>
+          <a:xfrm rot="10800000">
+            <a:off x="-3236" y="6138002"/>
+            <a:ext cx="11475236" cy="720000"/>
+          </a:xfrm>
+          <a:prstGeom prst="rect">
+            <a:avLst/>
+          </a:prstGeom>
+          <a:solidFill>
+            <a:schemeClr val="tx1"/>
+          </a:solidFill>
+          <a:ln w="63500">
+            <a:solidFill>
+              <a:schemeClr val="bg1"/>
+            </a:solidFill>
+          </a:ln>
+        </p:spPr>
+        <p:style>
+          <a:lnRef idx="2">
+            <a:schemeClr val="accent1">
+              <a:shade val="50000"/>
+            </a:schemeClr>
+          </a:lnRef>
+          <a:fillRef idx="1">
+            <a:schemeClr val="accent1"/>
+          </a:fillRef>
+          <a:effectRef idx="0">
+            <a:schemeClr val="accent1"/>
+          </a:effectRef>
+          <a:fontRef idx="minor">
+            <a:schemeClr val="lt1"/>
+          </a:fontRef>
+        </p:style>
+        <p:txBody>
+          <a:bodyPr rtlCol="0" anchor="ctr"/>
+          <a:lstStyle/>
+          <a:p>
+            <a:pPr algn="ctr"/>
+            <a:endParaRPr lang="nl-BE"/>
+          </a:p>
+        </p:txBody>
+      </p:sp>
+      <p:sp>
+        <p:nvSpPr>
+          <p:cNvPr id="10" name="Rechthoek 9"/>
+          <p:cNvSpPr/>
+          <p:nvPr/>
+        </p:nvSpPr>
+        <p:spPr>
+          <a:xfrm rot="5400000">
+            <a:off x="-2712237" y="2709001"/>
+            <a:ext cx="6138002" cy="720000"/>
+          </a:xfrm>
+          <a:prstGeom prst="rect">
+            <a:avLst/>
+          </a:prstGeom>
+          <a:solidFill>
+            <a:schemeClr val="tx1"/>
+          </a:solidFill>
+          <a:ln w="63500">
+            <a:solidFill>
+              <a:schemeClr val="bg1"/>
+            </a:solidFill>
+          </a:ln>
+        </p:spPr>
+        <p:style>
+          <a:lnRef idx="2">
+            <a:schemeClr val="accent1">
+              <a:shade val="50000"/>
+            </a:schemeClr>
+          </a:lnRef>
+          <a:fillRef idx="1">
+            <a:schemeClr val="accent1"/>
+          </a:fillRef>
+          <a:effectRef idx="0">
+            <a:schemeClr val="accent1"/>
+          </a:effectRef>
+          <a:fontRef idx="minor">
+            <a:schemeClr val="lt1"/>
+          </a:fontRef>
+        </p:style>
+        <p:txBody>
+          <a:bodyPr rtlCol="0" anchor="ctr"/>
+          <a:lstStyle/>
+          <a:p>
+            <a:pPr algn="ctr"/>
+            <a:endParaRPr lang="nl-BE"/>
+          </a:p>
+        </p:txBody>
+      </p:sp>
+      <p:pic>
+        <p:nvPicPr>
+          <p:cNvPr id="1026" name="Picture 2" descr="Afbeeldingsresultaat voor three bees logo">
+            <a:extLst>
+              <a:ext uri="{FF2B5EF4-FFF2-40B4-BE49-F238E27FC236}">
+                <a16:creationId xmlns:a16="http://schemas.microsoft.com/office/drawing/2014/main" id="{6D93AE98-E080-4353-AC39-9F77E11C2785}"/>
+              </a:ext>
+            </a:extLst>
+          </p:cNvPr>
+          <p:cNvPicPr>
+            <a:picLocks noChangeAspect="1" noChangeArrowheads="1"/>
+          </p:cNvPicPr>
+          <p:nvPr/>
+        </p:nvPicPr>
+        <p:blipFill>
+          <a:blip r:embed="rId3">
+            <a:extLst>
+              <a:ext uri="{28A0092B-C50C-407E-A947-70E740481C1C}">
+                <a14:useLocalDpi xmlns:a14="http://schemas.microsoft.com/office/drawing/2010/main" val="0"/>
+              </a:ext>
+            </a:extLst>
+          </a:blip>
+          <a:srcRect/>
+          <a:stretch>
+            <a:fillRect/>
+          </a:stretch>
+        </p:blipFill>
+        <p:spPr bwMode="auto">
+          <a:xfrm>
+            <a:off x="4771519" y="174075"/>
+            <a:ext cx="702930" cy="371850"/>
+          </a:xfrm>
+          <a:prstGeom prst="rect">
+            <a:avLst/>
+          </a:prstGeom>
+          <a:noFill/>
+          <a:extLst>
+            <a:ext uri="{909E8E84-426E-40DD-AFC4-6F175D3DCCD1}">
+              <a14:hiddenFill xmlns:a14="http://schemas.microsoft.com/office/drawing/2010/main">
+                <a:solidFill>
+                  <a:srgbClr val="FFFFFF"/>
+                </a:solidFill>
+              </a14:hiddenFill>
+            </a:ext>
+          </a:extLst>
+        </p:spPr>
+      </p:pic>
+      <p:sp>
+        <p:nvSpPr>
+          <p:cNvPr id="2" name="Rectangle 1">
+            <a:extLst>
+              <a:ext uri="{FF2B5EF4-FFF2-40B4-BE49-F238E27FC236}">
+                <a16:creationId xmlns:a16="http://schemas.microsoft.com/office/drawing/2014/main" id="{75F9711A-A664-44E5-B654-C67ECE4637CD}"/>
+              </a:ext>
+            </a:extLst>
+          </p:cNvPr>
+          <p:cNvSpPr/>
+          <p:nvPr/>
+        </p:nvSpPr>
+        <p:spPr>
+          <a:xfrm>
+            <a:off x="5477684" y="87134"/>
+            <a:ext cx="1236631" cy="545732"/>
+          </a:xfrm>
+          <a:prstGeom prst="rect">
+            <a:avLst/>
+          </a:prstGeom>
+        </p:spPr>
+        <p:style>
+          <a:lnRef idx="2">
+            <a:schemeClr val="dk1">
+              <a:shade val="50000"/>
+            </a:schemeClr>
+          </a:lnRef>
+          <a:fillRef idx="1">
+            <a:schemeClr val="dk1"/>
+          </a:fillRef>
+          <a:effectRef idx="0">
+            <a:schemeClr val="dk1"/>
+          </a:effectRef>
+          <a:fontRef idx="minor">
+            <a:schemeClr val="lt1"/>
+          </a:fontRef>
+        </p:style>
+        <p:txBody>
+          <a:bodyPr rtlCol="0" anchor="ctr"/>
+          <a:lstStyle/>
+          <a:p>
+            <a:pPr algn="ctr"/>
+            <a:r>
+              <a:rPr lang="nl-BE" dirty="0"/>
+              <a:t>3BEES&amp;ME</a:t>
+            </a:r>
+            <a:endParaRPr lang="LID4096" dirty="0"/>
+          </a:p>
+        </p:txBody>
+      </p:sp>
+      <p:sp>
+        <p:nvSpPr>
+          <p:cNvPr id="3" name="TextBox 2">
+            <a:extLst>
+              <a:ext uri="{FF2B5EF4-FFF2-40B4-BE49-F238E27FC236}">
+                <a16:creationId xmlns:a16="http://schemas.microsoft.com/office/drawing/2014/main" id="{E2EEB3FD-6150-4016-94FD-BB52060F8D5E}"/>
+              </a:ext>
+            </a:extLst>
+          </p:cNvPr>
+          <p:cNvSpPr txBox="1"/>
+          <p:nvPr/>
+        </p:nvSpPr>
+        <p:spPr>
+          <a:xfrm>
+            <a:off x="5484782" y="6313336"/>
+            <a:ext cx="1219201" cy="369332"/>
+          </a:xfrm>
+          <a:prstGeom prst="rect">
+            <a:avLst/>
+          </a:prstGeom>
+          <a:noFill/>
+        </p:spPr>
+        <p:txBody>
+          <a:bodyPr wrap="square" rtlCol="0">
+            <a:spAutoFit/>
+          </a:bodyPr>
+          <a:lstStyle/>
+          <a:p>
+            <a:pPr algn="ctr"/>
+            <a:r>
+              <a:rPr lang="nl-BE" dirty="0">
+                <a:solidFill>
+                  <a:schemeClr val="bg1"/>
+                </a:solidFill>
+              </a:rPr>
+              <a:t>is proud of</a:t>
+            </a:r>
+            <a:endParaRPr lang="LID4096" dirty="0">
+              <a:solidFill>
+                <a:schemeClr val="bg1"/>
+              </a:solidFill>
+            </a:endParaRPr>
+          </a:p>
+        </p:txBody>
+      </p:sp>
+      <p:sp>
+        <p:nvSpPr>
+          <p:cNvPr id="4" name="TextBox 3">
+            <a:extLst>
+              <a:ext uri="{FF2B5EF4-FFF2-40B4-BE49-F238E27FC236}">
+                <a16:creationId xmlns:a16="http://schemas.microsoft.com/office/drawing/2014/main" id="{2993F9C0-D9C6-4A40-96D5-31FB3655AE18}"/>
+              </a:ext>
+            </a:extLst>
+          </p:cNvPr>
+          <p:cNvSpPr txBox="1"/>
+          <p:nvPr/>
+        </p:nvSpPr>
+        <p:spPr>
+          <a:xfrm>
+            <a:off x="6703982" y="6313336"/>
+            <a:ext cx="3297268" cy="369332"/>
+          </a:xfrm>
+          <a:prstGeom prst="rect">
+            <a:avLst/>
+          </a:prstGeom>
+          <a:noFill/>
+        </p:spPr>
+        <p:txBody>
+          <a:bodyPr wrap="square" rtlCol="0">
+            <a:spAutoFit/>
+          </a:bodyPr>
+          <a:lstStyle/>
+          <a:p>
+            <a:r>
+              <a:rPr lang="nl-BE" dirty="0"/>
+              <a:t>his coach Badlapje</a:t>
+            </a:r>
+            <a:endParaRPr lang="LID4096" dirty="0"/>
+          </a:p>
+        </p:txBody>
+      </p:sp>
+      <p:sp>
+        <p:nvSpPr>
+          <p:cNvPr id="5" name="TextBox 4">
+            <a:extLst>
+              <a:ext uri="{FF2B5EF4-FFF2-40B4-BE49-F238E27FC236}">
+                <a16:creationId xmlns:a16="http://schemas.microsoft.com/office/drawing/2014/main" id="{0719F7B6-1D76-4D62-9EB7-B04AE387A135}"/>
+              </a:ext>
+            </a:extLst>
+          </p:cNvPr>
+          <p:cNvSpPr txBox="1"/>
+          <p:nvPr/>
+        </p:nvSpPr>
+        <p:spPr>
+          <a:xfrm>
+            <a:off x="3867151" y="6313336"/>
+            <a:ext cx="1713186" cy="369332"/>
+          </a:xfrm>
+          <a:prstGeom prst="rect">
+            <a:avLst/>
+          </a:prstGeom>
+          <a:noFill/>
+        </p:spPr>
+        <p:txBody>
+          <a:bodyPr wrap="square" rtlCol="0">
+            <a:spAutoFit/>
+          </a:bodyPr>
+          <a:lstStyle/>
+          <a:p>
+            <a:pPr algn="r"/>
+            <a:r>
+              <a:rPr lang="nl-BE" dirty="0">
+                <a:solidFill>
+                  <a:schemeClr val="bg1"/>
+                </a:solidFill>
+              </a:rPr>
+              <a:t>BREND</a:t>
+            </a:r>
+            <a:endParaRPr lang="LID4096" dirty="0">
+              <a:solidFill>
+                <a:schemeClr val="bg1"/>
+              </a:solidFill>
+            </a:endParaRPr>
+          </a:p>
+        </p:txBody>
+      </p:sp>
+    </p:spTree>
+    <p:extLst>
+      <p:ext uri="{BB962C8B-B14F-4D97-AF65-F5344CB8AC3E}">
+        <p14:creationId xmlns:p14="http://schemas.microsoft.com/office/powerpoint/2010/main" val="2538337335"/>
+      </p:ext>
+    </p:extLst>
+  </p:cSld>
+  <p:clrMapOvr>
+    <a:masterClrMapping/>
+  </p:clrMapOvr>
+  <mc:AlternateContent xmlns:mc="http://schemas.openxmlformats.org/markup-compatibility/2006">
+    <mc:Choice xmlns:p14="http://schemas.microsoft.com/office/powerpoint/2010/main" Requires="p14">
+      <p:transition spd="med" p14:dur="700">
+        <p:fade/>
+      </p:transition>
+    </mc:Choice>
+    <mc:Fallback>
+      <p:transition spd="med">
+        <p:fade/>
+      </p:transition>
+    </mc:Fallback>
+  </mc:AlternateContent>
+</p:sld>
+</file>
+
+<file path=ppt/slides/slide11.xml><?xml version="1.0" encoding="utf-8"?>
 <p:sld xmlns:a="http://schemas.openxmlformats.org/drawingml/2006/main" xmlns:r="http://schemas.openxmlformats.org/officeDocument/2006/relationships" xmlns:p="http://schemas.openxmlformats.org/presentationml/2006/main">
   <p:cSld>
     <p:bg>
@@ -11719,6 +12269,437 @@
           <a:lstStyle/>
           <a:p>
             <a:pPr algn="ctr"/>
+            <a:endParaRPr lang="nl-BE" dirty="0"/>
+          </a:p>
+        </p:txBody>
+      </p:sp>
+      <p:sp>
+        <p:nvSpPr>
+          <p:cNvPr id="10" name="Rechthoek 9"/>
+          <p:cNvSpPr/>
+          <p:nvPr/>
+        </p:nvSpPr>
+        <p:spPr>
+          <a:xfrm rot="5400000">
+            <a:off x="-2712237" y="2709001"/>
+            <a:ext cx="6138002" cy="720000"/>
+          </a:xfrm>
+          <a:prstGeom prst="rect">
+            <a:avLst/>
+          </a:prstGeom>
+          <a:solidFill>
+            <a:schemeClr val="tx1"/>
+          </a:solidFill>
+          <a:ln w="63500">
+            <a:solidFill>
+              <a:schemeClr val="bg1"/>
+            </a:solidFill>
+          </a:ln>
+        </p:spPr>
+        <p:style>
+          <a:lnRef idx="2">
+            <a:schemeClr val="accent1">
+              <a:shade val="50000"/>
+            </a:schemeClr>
+          </a:lnRef>
+          <a:fillRef idx="1">
+            <a:schemeClr val="accent1"/>
+          </a:fillRef>
+          <a:effectRef idx="0">
+            <a:schemeClr val="accent1"/>
+          </a:effectRef>
+          <a:fontRef idx="minor">
+            <a:schemeClr val="lt1"/>
+          </a:fontRef>
+        </p:style>
+        <p:txBody>
+          <a:bodyPr rtlCol="0" anchor="ctr"/>
+          <a:lstStyle/>
+          <a:p>
+            <a:pPr algn="ctr"/>
+            <a:endParaRPr lang="nl-BE"/>
+          </a:p>
+        </p:txBody>
+      </p:sp>
+      <p:pic>
+        <p:nvPicPr>
+          <p:cNvPr id="1026" name="Picture 2" descr="Afbeeldingsresultaat voor three bees logo">
+            <a:extLst>
+              <a:ext uri="{FF2B5EF4-FFF2-40B4-BE49-F238E27FC236}">
+                <a16:creationId xmlns:a16="http://schemas.microsoft.com/office/drawing/2014/main" id="{6D93AE98-E080-4353-AC39-9F77E11C2785}"/>
+              </a:ext>
+            </a:extLst>
+          </p:cNvPr>
+          <p:cNvPicPr>
+            <a:picLocks noChangeAspect="1" noChangeArrowheads="1"/>
+          </p:cNvPicPr>
+          <p:nvPr/>
+        </p:nvPicPr>
+        <p:blipFill>
+          <a:blip r:embed="rId3">
+            <a:extLst>
+              <a:ext uri="{28A0092B-C50C-407E-A947-70E740481C1C}">
+                <a14:useLocalDpi xmlns:a14="http://schemas.microsoft.com/office/drawing/2010/main" val="0"/>
+              </a:ext>
+            </a:extLst>
+          </a:blip>
+          <a:srcRect/>
+          <a:stretch>
+            <a:fillRect/>
+          </a:stretch>
+        </p:blipFill>
+        <p:spPr bwMode="auto">
+          <a:xfrm>
+            <a:off x="4771519" y="174075"/>
+            <a:ext cx="702930" cy="371850"/>
+          </a:xfrm>
+          <a:prstGeom prst="rect">
+            <a:avLst/>
+          </a:prstGeom>
+          <a:noFill/>
+          <a:extLst>
+            <a:ext uri="{909E8E84-426E-40DD-AFC4-6F175D3DCCD1}">
+              <a14:hiddenFill xmlns:a14="http://schemas.microsoft.com/office/drawing/2010/main">
+                <a:solidFill>
+                  <a:srgbClr val="FFFFFF"/>
+                </a:solidFill>
+              </a14:hiddenFill>
+            </a:ext>
+          </a:extLst>
+        </p:spPr>
+      </p:pic>
+      <p:sp>
+        <p:nvSpPr>
+          <p:cNvPr id="2" name="Rectangle 1">
+            <a:extLst>
+              <a:ext uri="{FF2B5EF4-FFF2-40B4-BE49-F238E27FC236}">
+                <a16:creationId xmlns:a16="http://schemas.microsoft.com/office/drawing/2014/main" id="{75F9711A-A664-44E5-B654-C67ECE4637CD}"/>
+              </a:ext>
+            </a:extLst>
+          </p:cNvPr>
+          <p:cNvSpPr/>
+          <p:nvPr/>
+        </p:nvSpPr>
+        <p:spPr>
+          <a:xfrm>
+            <a:off x="5477684" y="87134"/>
+            <a:ext cx="1236631" cy="545732"/>
+          </a:xfrm>
+          <a:prstGeom prst="rect">
+            <a:avLst/>
+          </a:prstGeom>
+        </p:spPr>
+        <p:style>
+          <a:lnRef idx="2">
+            <a:schemeClr val="dk1">
+              <a:shade val="50000"/>
+            </a:schemeClr>
+          </a:lnRef>
+          <a:fillRef idx="1">
+            <a:schemeClr val="dk1"/>
+          </a:fillRef>
+          <a:effectRef idx="0">
+            <a:schemeClr val="dk1"/>
+          </a:effectRef>
+          <a:fontRef idx="minor">
+            <a:schemeClr val="lt1"/>
+          </a:fontRef>
+        </p:style>
+        <p:txBody>
+          <a:bodyPr rtlCol="0" anchor="ctr"/>
+          <a:lstStyle/>
+          <a:p>
+            <a:pPr algn="ctr"/>
+            <a:r>
+              <a:rPr lang="nl-BE" dirty="0"/>
+              <a:t>3BEES&amp;ME</a:t>
+            </a:r>
+            <a:endParaRPr lang="LID4096" dirty="0"/>
+          </a:p>
+        </p:txBody>
+      </p:sp>
+      <p:pic>
+        <p:nvPicPr>
+          <p:cNvPr id="11" name="Picture 2" descr="Afbeeldingsresultaat voor three bees logo">
+            <a:extLst>
+              <a:ext uri="{FF2B5EF4-FFF2-40B4-BE49-F238E27FC236}">
+                <a16:creationId xmlns:a16="http://schemas.microsoft.com/office/drawing/2014/main" id="{B4615D5B-B048-4326-9746-3C92C77B2A01}"/>
+              </a:ext>
+            </a:extLst>
+          </p:cNvPr>
+          <p:cNvPicPr>
+            <a:picLocks noChangeAspect="1" noChangeArrowheads="1"/>
+          </p:cNvPicPr>
+          <p:nvPr/>
+        </p:nvPicPr>
+        <p:blipFill>
+          <a:blip r:embed="rId3">
+            <a:extLst>
+              <a:ext uri="{28A0092B-C50C-407E-A947-70E740481C1C}">
+                <a14:useLocalDpi xmlns:a14="http://schemas.microsoft.com/office/drawing/2010/main" val="0"/>
+              </a:ext>
+            </a:extLst>
+          </a:blip>
+          <a:srcRect/>
+          <a:stretch>
+            <a:fillRect/>
+          </a:stretch>
+        </p:blipFill>
+        <p:spPr bwMode="auto">
+          <a:xfrm>
+            <a:off x="2395750" y="1471569"/>
+            <a:ext cx="7400498" cy="3914862"/>
+          </a:xfrm>
+          <a:prstGeom prst="rect">
+            <a:avLst/>
+          </a:prstGeom>
+          <a:noFill/>
+          <a:extLst>
+            <a:ext uri="{909E8E84-426E-40DD-AFC4-6F175D3DCCD1}">
+              <a14:hiddenFill xmlns:a14="http://schemas.microsoft.com/office/drawing/2010/main">
+                <a:solidFill>
+                  <a:srgbClr val="FFFFFF"/>
+                </a:solidFill>
+              </a14:hiddenFill>
+            </a:ext>
+          </a:extLst>
+        </p:spPr>
+      </p:pic>
+      <p:sp>
+        <p:nvSpPr>
+          <p:cNvPr id="16" name="TextBox 15">
+            <a:extLst>
+              <a:ext uri="{FF2B5EF4-FFF2-40B4-BE49-F238E27FC236}">
+                <a16:creationId xmlns:a16="http://schemas.microsoft.com/office/drawing/2014/main" id="{6DEC945F-D1C0-4055-B21D-161290ADE164}"/>
+              </a:ext>
+            </a:extLst>
+          </p:cNvPr>
+          <p:cNvSpPr txBox="1"/>
+          <p:nvPr/>
+        </p:nvSpPr>
+        <p:spPr>
+          <a:xfrm>
+            <a:off x="4560894" y="6205614"/>
+            <a:ext cx="3066974" cy="584775"/>
+          </a:xfrm>
+          <a:prstGeom prst="rect">
+            <a:avLst/>
+          </a:prstGeom>
+          <a:noFill/>
+        </p:spPr>
+        <p:txBody>
+          <a:bodyPr wrap="square" rtlCol="0">
+            <a:spAutoFit/>
+          </a:bodyPr>
+          <a:lstStyle/>
+          <a:p>
+            <a:pPr algn="ctr"/>
+            <a:r>
+              <a:rPr lang="nl-BE" sz="3200" dirty="0">
+                <a:solidFill>
+                  <a:schemeClr val="bg1"/>
+                </a:solidFill>
+              </a:rPr>
+              <a:t>WE ARE PROUD</a:t>
+            </a:r>
+            <a:endParaRPr lang="LID4096" sz="3200" dirty="0">
+              <a:solidFill>
+                <a:schemeClr val="bg1"/>
+              </a:solidFill>
+            </a:endParaRPr>
+          </a:p>
+        </p:txBody>
+      </p:sp>
+    </p:spTree>
+    <p:extLst>
+      <p:ext uri="{BB962C8B-B14F-4D97-AF65-F5344CB8AC3E}">
+        <p14:creationId xmlns:p14="http://schemas.microsoft.com/office/powerpoint/2010/main" val="1552030440"/>
+      </p:ext>
+    </p:extLst>
+  </p:cSld>
+  <p:clrMapOvr>
+    <a:masterClrMapping/>
+  </p:clrMapOvr>
+  <mc:AlternateContent xmlns:mc="http://schemas.openxmlformats.org/markup-compatibility/2006">
+    <mc:Choice xmlns:p14="http://schemas.microsoft.com/office/powerpoint/2010/main" Requires="p14">
+      <p:transition spd="med" p14:dur="700">
+        <p:fade/>
+      </p:transition>
+    </mc:Choice>
+    <mc:Fallback>
+      <p:transition spd="med">
+        <p:fade/>
+      </p:transition>
+    </mc:Fallback>
+  </mc:AlternateContent>
+</p:sld>
+</file>
+
+<file path=ppt/slides/slide8.xml><?xml version="1.0" encoding="utf-8"?>
+<p:sld xmlns:a="http://schemas.openxmlformats.org/drawingml/2006/main" xmlns:r="http://schemas.openxmlformats.org/officeDocument/2006/relationships" xmlns:p="http://schemas.openxmlformats.org/presentationml/2006/main">
+  <p:cSld>
+    <p:bg>
+      <p:bgPr>
+        <a:solidFill>
+          <a:schemeClr val="tx1"/>
+        </a:solidFill>
+        <a:effectLst/>
+      </p:bgPr>
+    </p:bg>
+    <p:spTree>
+      <p:nvGrpSpPr>
+        <p:cNvPr id="1" name=""/>
+        <p:cNvGrpSpPr/>
+        <p:nvPr/>
+      </p:nvGrpSpPr>
+      <p:grpSpPr>
+        <a:xfrm>
+          <a:off x="0" y="0"/>
+          <a:ext cx="0" cy="0"/>
+          <a:chOff x="0" y="0"/>
+          <a:chExt cx="0" cy="0"/>
+        </a:xfrm>
+      </p:grpSpPr>
+      <p:sp>
+        <p:nvSpPr>
+          <p:cNvPr id="7" name="Rechthoek 6"/>
+          <p:cNvSpPr/>
+          <p:nvPr/>
+        </p:nvSpPr>
+        <p:spPr>
+          <a:xfrm>
+            <a:off x="716764" y="0"/>
+            <a:ext cx="11472001" cy="720000"/>
+          </a:xfrm>
+          <a:prstGeom prst="rect">
+            <a:avLst/>
+          </a:prstGeom>
+          <a:solidFill>
+            <a:schemeClr val="tx1"/>
+          </a:solidFill>
+          <a:ln w="63500">
+            <a:solidFill>
+              <a:schemeClr val="bg1"/>
+            </a:solidFill>
+          </a:ln>
+        </p:spPr>
+        <p:style>
+          <a:lnRef idx="2">
+            <a:schemeClr val="accent1">
+              <a:shade val="50000"/>
+            </a:schemeClr>
+          </a:lnRef>
+          <a:fillRef idx="1">
+            <a:schemeClr val="accent1"/>
+          </a:fillRef>
+          <a:effectRef idx="0">
+            <a:schemeClr val="accent1"/>
+          </a:effectRef>
+          <a:fontRef idx="minor">
+            <a:schemeClr val="lt1"/>
+          </a:fontRef>
+        </p:style>
+        <p:txBody>
+          <a:bodyPr rtlCol="0" anchor="ctr"/>
+          <a:lstStyle/>
+          <a:p>
+            <a:pPr algn="ctr"/>
+            <a:endParaRPr lang="nl-BE" dirty="0"/>
+          </a:p>
+        </p:txBody>
+      </p:sp>
+      <p:sp>
+        <p:nvSpPr>
+          <p:cNvPr id="8" name="Rechthoek 7"/>
+          <p:cNvSpPr/>
+          <p:nvPr/>
+        </p:nvSpPr>
+        <p:spPr>
+          <a:xfrm rot="5400000">
+            <a:off x="8762999" y="3429001"/>
+            <a:ext cx="6138002" cy="720000"/>
+          </a:xfrm>
+          <a:prstGeom prst="rect">
+            <a:avLst/>
+          </a:prstGeom>
+          <a:solidFill>
+            <a:schemeClr val="tx1"/>
+          </a:solidFill>
+          <a:ln w="63500">
+            <a:solidFill>
+              <a:schemeClr val="bg1"/>
+            </a:solidFill>
+          </a:ln>
+        </p:spPr>
+        <p:style>
+          <a:lnRef idx="2">
+            <a:schemeClr val="accent1">
+              <a:shade val="50000"/>
+            </a:schemeClr>
+          </a:lnRef>
+          <a:fillRef idx="1">
+            <a:schemeClr val="accent1"/>
+          </a:fillRef>
+          <a:effectRef idx="0">
+            <a:schemeClr val="accent1"/>
+          </a:effectRef>
+          <a:fontRef idx="minor">
+            <a:schemeClr val="lt1"/>
+          </a:fontRef>
+        </p:style>
+        <p:txBody>
+          <a:bodyPr rtlCol="0" anchor="ctr"/>
+          <a:lstStyle/>
+          <a:p>
+            <a:pPr algn="ctr"/>
+            <a:endParaRPr lang="nl-BE"/>
+          </a:p>
+        </p:txBody>
+      </p:sp>
+      <p:sp>
+        <p:nvSpPr>
+          <p:cNvPr id="9" name="Rechthoek 8"/>
+          <p:cNvSpPr/>
+          <p:nvPr/>
+        </p:nvSpPr>
+        <p:spPr>
+          <a:xfrm rot="10800000">
+            <a:off x="-3236" y="6138002"/>
+            <a:ext cx="11475236" cy="720000"/>
+          </a:xfrm>
+          <a:prstGeom prst="rect">
+            <a:avLst/>
+          </a:prstGeom>
+          <a:solidFill>
+            <a:schemeClr val="tx1"/>
+          </a:solidFill>
+          <a:ln w="63500">
+            <a:solidFill>
+              <a:schemeClr val="bg1"/>
+            </a:solidFill>
+          </a:ln>
+        </p:spPr>
+        <p:style>
+          <a:lnRef idx="2">
+            <a:schemeClr val="accent1">
+              <a:shade val="50000"/>
+            </a:schemeClr>
+          </a:lnRef>
+          <a:fillRef idx="1">
+            <a:schemeClr val="accent1"/>
+          </a:fillRef>
+          <a:effectRef idx="0">
+            <a:schemeClr val="accent1"/>
+          </a:effectRef>
+          <a:fontRef idx="minor">
+            <a:schemeClr val="lt1"/>
+          </a:fontRef>
+        </p:style>
+        <p:txBody>
+          <a:bodyPr rtlCol="0" anchor="ctr"/>
+          <a:lstStyle/>
+          <a:p>
+            <a:pPr algn="ctr"/>
             <a:endParaRPr lang="nl-BE"/>
           </a:p>
         </p:txBody>
@@ -12162,471 +13143,6 @@
 </p:sld>
 </file>
 
-<file path=ppt/slides/slide8.xml><?xml version="1.0" encoding="utf-8"?>
-<p:sld xmlns:a="http://schemas.openxmlformats.org/drawingml/2006/main" xmlns:r="http://schemas.openxmlformats.org/officeDocument/2006/relationships" xmlns:p="http://schemas.openxmlformats.org/presentationml/2006/main">
-  <p:cSld>
-    <p:bg>
-      <p:bgPr>
-        <a:solidFill>
-          <a:schemeClr val="tx1"/>
-        </a:solidFill>
-        <a:effectLst/>
-      </p:bgPr>
-    </p:bg>
-    <p:spTree>
-      <p:nvGrpSpPr>
-        <p:cNvPr id="1" name=""/>
-        <p:cNvGrpSpPr/>
-        <p:nvPr/>
-      </p:nvGrpSpPr>
-      <p:grpSpPr>
-        <a:xfrm>
-          <a:off x="0" y="0"/>
-          <a:ext cx="0" cy="0"/>
-          <a:chOff x="0" y="0"/>
-          <a:chExt cx="0" cy="0"/>
-        </a:xfrm>
-      </p:grpSpPr>
-      <p:sp>
-        <p:nvSpPr>
-          <p:cNvPr id="7" name="Rechthoek 6"/>
-          <p:cNvSpPr/>
-          <p:nvPr/>
-        </p:nvSpPr>
-        <p:spPr>
-          <a:xfrm>
-            <a:off x="716764" y="0"/>
-            <a:ext cx="11472001" cy="720000"/>
-          </a:xfrm>
-          <a:prstGeom prst="rect">
-            <a:avLst/>
-          </a:prstGeom>
-          <a:solidFill>
-            <a:schemeClr val="tx1"/>
-          </a:solidFill>
-          <a:ln w="63500">
-            <a:solidFill>
-              <a:schemeClr val="bg1"/>
-            </a:solidFill>
-          </a:ln>
-        </p:spPr>
-        <p:style>
-          <a:lnRef idx="2">
-            <a:schemeClr val="accent1">
-              <a:shade val="50000"/>
-            </a:schemeClr>
-          </a:lnRef>
-          <a:fillRef idx="1">
-            <a:schemeClr val="accent1"/>
-          </a:fillRef>
-          <a:effectRef idx="0">
-            <a:schemeClr val="accent1"/>
-          </a:effectRef>
-          <a:fontRef idx="minor">
-            <a:schemeClr val="lt1"/>
-          </a:fontRef>
-        </p:style>
-        <p:txBody>
-          <a:bodyPr rtlCol="0" anchor="ctr"/>
-          <a:lstStyle/>
-          <a:p>
-            <a:pPr algn="ctr"/>
-            <a:endParaRPr lang="nl-BE" dirty="0"/>
-          </a:p>
-        </p:txBody>
-      </p:sp>
-      <p:sp>
-        <p:nvSpPr>
-          <p:cNvPr id="8" name="Rechthoek 7"/>
-          <p:cNvSpPr/>
-          <p:nvPr/>
-        </p:nvSpPr>
-        <p:spPr>
-          <a:xfrm rot="5400000">
-            <a:off x="8762999" y="3429001"/>
-            <a:ext cx="6138002" cy="720000"/>
-          </a:xfrm>
-          <a:prstGeom prst="rect">
-            <a:avLst/>
-          </a:prstGeom>
-          <a:solidFill>
-            <a:schemeClr val="tx1"/>
-          </a:solidFill>
-          <a:ln w="63500">
-            <a:solidFill>
-              <a:schemeClr val="bg1"/>
-            </a:solidFill>
-          </a:ln>
-        </p:spPr>
-        <p:style>
-          <a:lnRef idx="2">
-            <a:schemeClr val="accent1">
-              <a:shade val="50000"/>
-            </a:schemeClr>
-          </a:lnRef>
-          <a:fillRef idx="1">
-            <a:schemeClr val="accent1"/>
-          </a:fillRef>
-          <a:effectRef idx="0">
-            <a:schemeClr val="accent1"/>
-          </a:effectRef>
-          <a:fontRef idx="minor">
-            <a:schemeClr val="lt1"/>
-          </a:fontRef>
-        </p:style>
-        <p:txBody>
-          <a:bodyPr rtlCol="0" anchor="ctr"/>
-          <a:lstStyle/>
-          <a:p>
-            <a:pPr algn="ctr"/>
-            <a:endParaRPr lang="nl-BE"/>
-          </a:p>
-        </p:txBody>
-      </p:sp>
-      <p:sp>
-        <p:nvSpPr>
-          <p:cNvPr id="9" name="Rechthoek 8"/>
-          <p:cNvSpPr/>
-          <p:nvPr/>
-        </p:nvSpPr>
-        <p:spPr>
-          <a:xfrm rot="10800000">
-            <a:off x="-3236" y="6138002"/>
-            <a:ext cx="11475236" cy="720000"/>
-          </a:xfrm>
-          <a:prstGeom prst="rect">
-            <a:avLst/>
-          </a:prstGeom>
-          <a:solidFill>
-            <a:schemeClr val="tx1"/>
-          </a:solidFill>
-          <a:ln w="63500">
-            <a:solidFill>
-              <a:schemeClr val="bg1"/>
-            </a:solidFill>
-          </a:ln>
-        </p:spPr>
-        <p:style>
-          <a:lnRef idx="2">
-            <a:schemeClr val="accent1">
-              <a:shade val="50000"/>
-            </a:schemeClr>
-          </a:lnRef>
-          <a:fillRef idx="1">
-            <a:schemeClr val="accent1"/>
-          </a:fillRef>
-          <a:effectRef idx="0">
-            <a:schemeClr val="accent1"/>
-          </a:effectRef>
-          <a:fontRef idx="minor">
-            <a:schemeClr val="lt1"/>
-          </a:fontRef>
-        </p:style>
-        <p:txBody>
-          <a:bodyPr rtlCol="0" anchor="ctr"/>
-          <a:lstStyle/>
-          <a:p>
-            <a:pPr algn="ctr"/>
-            <a:endParaRPr lang="nl-BE"/>
-          </a:p>
-        </p:txBody>
-      </p:sp>
-      <p:sp>
-        <p:nvSpPr>
-          <p:cNvPr id="10" name="Rechthoek 9"/>
-          <p:cNvSpPr/>
-          <p:nvPr/>
-        </p:nvSpPr>
-        <p:spPr>
-          <a:xfrm rot="5400000">
-            <a:off x="-2712237" y="2709001"/>
-            <a:ext cx="6138002" cy="720000"/>
-          </a:xfrm>
-          <a:prstGeom prst="rect">
-            <a:avLst/>
-          </a:prstGeom>
-          <a:solidFill>
-            <a:schemeClr val="tx1"/>
-          </a:solidFill>
-          <a:ln w="63500">
-            <a:solidFill>
-              <a:schemeClr val="bg1"/>
-            </a:solidFill>
-          </a:ln>
-        </p:spPr>
-        <p:style>
-          <a:lnRef idx="2">
-            <a:schemeClr val="accent1">
-              <a:shade val="50000"/>
-            </a:schemeClr>
-          </a:lnRef>
-          <a:fillRef idx="1">
-            <a:schemeClr val="accent1"/>
-          </a:fillRef>
-          <a:effectRef idx="0">
-            <a:schemeClr val="accent1"/>
-          </a:effectRef>
-          <a:fontRef idx="minor">
-            <a:schemeClr val="lt1"/>
-          </a:fontRef>
-        </p:style>
-        <p:txBody>
-          <a:bodyPr rtlCol="0" anchor="ctr"/>
-          <a:lstStyle/>
-          <a:p>
-            <a:pPr algn="ctr"/>
-            <a:endParaRPr lang="nl-BE"/>
-          </a:p>
-        </p:txBody>
-      </p:sp>
-      <p:pic>
-        <p:nvPicPr>
-          <p:cNvPr id="1026" name="Picture 2" descr="Afbeeldingsresultaat voor three bees logo">
-            <a:extLst>
-              <a:ext uri="{FF2B5EF4-FFF2-40B4-BE49-F238E27FC236}">
-                <a16:creationId xmlns:a16="http://schemas.microsoft.com/office/drawing/2014/main" id="{6D93AE98-E080-4353-AC39-9F77E11C2785}"/>
-              </a:ext>
-            </a:extLst>
-          </p:cNvPr>
-          <p:cNvPicPr>
-            <a:picLocks noChangeAspect="1" noChangeArrowheads="1"/>
-          </p:cNvPicPr>
-          <p:nvPr/>
-        </p:nvPicPr>
-        <p:blipFill>
-          <a:blip r:embed="rId3">
-            <a:extLst>
-              <a:ext uri="{28A0092B-C50C-407E-A947-70E740481C1C}">
-                <a14:useLocalDpi xmlns:a14="http://schemas.microsoft.com/office/drawing/2010/main" val="0"/>
-              </a:ext>
-            </a:extLst>
-          </a:blip>
-          <a:srcRect/>
-          <a:stretch>
-            <a:fillRect/>
-          </a:stretch>
-        </p:blipFill>
-        <p:spPr bwMode="auto">
-          <a:xfrm>
-            <a:off x="4771519" y="174075"/>
-            <a:ext cx="702930" cy="371850"/>
-          </a:xfrm>
-          <a:prstGeom prst="rect">
-            <a:avLst/>
-          </a:prstGeom>
-          <a:noFill/>
-          <a:extLst>
-            <a:ext uri="{909E8E84-426E-40DD-AFC4-6F175D3DCCD1}">
-              <a14:hiddenFill xmlns:a14="http://schemas.microsoft.com/office/drawing/2010/main">
-                <a:solidFill>
-                  <a:srgbClr val="FFFFFF"/>
-                </a:solidFill>
-              </a14:hiddenFill>
-            </a:ext>
-          </a:extLst>
-        </p:spPr>
-      </p:pic>
-      <p:sp>
-        <p:nvSpPr>
-          <p:cNvPr id="2" name="Rectangle 1">
-            <a:extLst>
-              <a:ext uri="{FF2B5EF4-FFF2-40B4-BE49-F238E27FC236}">
-                <a16:creationId xmlns:a16="http://schemas.microsoft.com/office/drawing/2014/main" id="{75F9711A-A664-44E5-B654-C67ECE4637CD}"/>
-              </a:ext>
-            </a:extLst>
-          </p:cNvPr>
-          <p:cNvSpPr/>
-          <p:nvPr/>
-        </p:nvSpPr>
-        <p:spPr>
-          <a:xfrm>
-            <a:off x="5477684" y="87134"/>
-            <a:ext cx="1236631" cy="545732"/>
-          </a:xfrm>
-          <a:prstGeom prst="rect">
-            <a:avLst/>
-          </a:prstGeom>
-        </p:spPr>
-        <p:style>
-          <a:lnRef idx="2">
-            <a:schemeClr val="dk1">
-              <a:shade val="50000"/>
-            </a:schemeClr>
-          </a:lnRef>
-          <a:fillRef idx="1">
-            <a:schemeClr val="dk1"/>
-          </a:fillRef>
-          <a:effectRef idx="0">
-            <a:schemeClr val="dk1"/>
-          </a:effectRef>
-          <a:fontRef idx="minor">
-            <a:schemeClr val="lt1"/>
-          </a:fontRef>
-        </p:style>
-        <p:txBody>
-          <a:bodyPr rtlCol="0" anchor="ctr"/>
-          <a:lstStyle/>
-          <a:p>
-            <a:pPr algn="ctr"/>
-            <a:r>
-              <a:rPr lang="nl-BE" dirty="0"/>
-              <a:t>3BEES&amp;ME</a:t>
-            </a:r>
-            <a:endParaRPr lang="LID4096" dirty="0"/>
-          </a:p>
-        </p:txBody>
-      </p:sp>
-      <p:sp>
-        <p:nvSpPr>
-          <p:cNvPr id="3" name="TextBox 2">
-            <a:extLst>
-              <a:ext uri="{FF2B5EF4-FFF2-40B4-BE49-F238E27FC236}">
-                <a16:creationId xmlns:a16="http://schemas.microsoft.com/office/drawing/2014/main" id="{E2EEB3FD-6150-4016-94FD-BB52060F8D5E}"/>
-              </a:ext>
-            </a:extLst>
-          </p:cNvPr>
-          <p:cNvSpPr txBox="1"/>
-          <p:nvPr/>
-        </p:nvSpPr>
-        <p:spPr>
-          <a:xfrm>
-            <a:off x="5484782" y="6313336"/>
-            <a:ext cx="1219201" cy="369332"/>
-          </a:xfrm>
-          <a:prstGeom prst="rect">
-            <a:avLst/>
-          </a:prstGeom>
-          <a:noFill/>
-        </p:spPr>
-        <p:txBody>
-          <a:bodyPr wrap="square" rtlCol="0">
-            <a:spAutoFit/>
-          </a:bodyPr>
-          <a:lstStyle/>
-          <a:p>
-            <a:pPr algn="ctr"/>
-            <a:r>
-              <a:rPr lang="nl-BE" dirty="0">
-                <a:solidFill>
-                  <a:schemeClr val="bg1"/>
-                </a:solidFill>
-              </a:rPr>
-              <a:t>is proud of</a:t>
-            </a:r>
-            <a:endParaRPr lang="LID4096" dirty="0">
-              <a:solidFill>
-                <a:schemeClr val="bg1"/>
-              </a:solidFill>
-            </a:endParaRPr>
-          </a:p>
-        </p:txBody>
-      </p:sp>
-      <p:sp>
-        <p:nvSpPr>
-          <p:cNvPr id="4" name="TextBox 3">
-            <a:extLst>
-              <a:ext uri="{FF2B5EF4-FFF2-40B4-BE49-F238E27FC236}">
-                <a16:creationId xmlns:a16="http://schemas.microsoft.com/office/drawing/2014/main" id="{2993F9C0-D9C6-4A40-96D5-31FB3655AE18}"/>
-              </a:ext>
-            </a:extLst>
-          </p:cNvPr>
-          <p:cNvSpPr txBox="1"/>
-          <p:nvPr/>
-        </p:nvSpPr>
-        <p:spPr>
-          <a:xfrm>
-            <a:off x="6703982" y="6313336"/>
-            <a:ext cx="3325843" cy="369332"/>
-          </a:xfrm>
-          <a:prstGeom prst="rect">
-            <a:avLst/>
-          </a:prstGeom>
-          <a:noFill/>
-        </p:spPr>
-        <p:txBody>
-          <a:bodyPr wrap="square" rtlCol="0">
-            <a:spAutoFit/>
-          </a:bodyPr>
-          <a:lstStyle/>
-          <a:p>
-            <a:r>
-              <a:rPr lang="nl-BE" dirty="0"/>
-              <a:t>his coach Badlapje</a:t>
-            </a:r>
-            <a:endParaRPr lang="LID4096" dirty="0"/>
-          </a:p>
-        </p:txBody>
-      </p:sp>
-      <p:sp>
-        <p:nvSpPr>
-          <p:cNvPr id="5" name="TextBox 4">
-            <a:extLst>
-              <a:ext uri="{FF2B5EF4-FFF2-40B4-BE49-F238E27FC236}">
-                <a16:creationId xmlns:a16="http://schemas.microsoft.com/office/drawing/2014/main" id="{0719F7B6-1D76-4D62-9EB7-B04AE387A135}"/>
-              </a:ext>
-            </a:extLst>
-          </p:cNvPr>
-          <p:cNvSpPr txBox="1"/>
-          <p:nvPr/>
-        </p:nvSpPr>
-        <p:spPr>
-          <a:xfrm>
-            <a:off x="3867151" y="6313336"/>
-            <a:ext cx="1713186" cy="369332"/>
-          </a:xfrm>
-          <a:prstGeom prst="rect">
-            <a:avLst/>
-          </a:prstGeom>
-          <a:noFill/>
-        </p:spPr>
-        <p:txBody>
-          <a:bodyPr wrap="square" rtlCol="0">
-            <a:spAutoFit/>
-          </a:bodyPr>
-          <a:lstStyle/>
-          <a:p>
-            <a:pPr algn="r"/>
-            <a:r>
-              <a:rPr lang="nl-BE" dirty="0">
-                <a:solidFill>
-                  <a:schemeClr val="bg1"/>
-                </a:solidFill>
-              </a:rPr>
-              <a:t>BERT</a:t>
-            </a:r>
-            <a:endParaRPr lang="LID4096" dirty="0">
-              <a:solidFill>
-                <a:schemeClr val="bg1"/>
-              </a:solidFill>
-            </a:endParaRPr>
-          </a:p>
-        </p:txBody>
-      </p:sp>
-    </p:spTree>
-    <p:extLst>
-      <p:ext uri="{BB962C8B-B14F-4D97-AF65-F5344CB8AC3E}">
-        <p14:creationId xmlns:p14="http://schemas.microsoft.com/office/powerpoint/2010/main" val="3732158348"/>
-      </p:ext>
-    </p:extLst>
-  </p:cSld>
-  <p:clrMapOvr>
-    <a:masterClrMapping/>
-  </p:clrMapOvr>
-  <mc:AlternateContent xmlns:mc="http://schemas.openxmlformats.org/markup-compatibility/2006">
-    <mc:Choice xmlns:p14="http://schemas.microsoft.com/office/powerpoint/2010/main" Requires="p14">
-      <p:transition spd="med" p14:dur="700">
-        <p:fade/>
-      </p:transition>
-    </mc:Choice>
-    <mc:Fallback>
-      <p:transition spd="med">
-        <p:fade/>
-      </p:transition>
-    </mc:Fallback>
-  </mc:AlternateContent>
-</p:sld>
-</file>
-
 <file path=ppt/slides/slide9.xml><?xml version="1.0" encoding="utf-8"?>
 <p:sld xmlns:a="http://schemas.openxmlformats.org/drawingml/2006/main" xmlns:r="http://schemas.openxmlformats.org/officeDocument/2006/relationships" xmlns:p="http://schemas.openxmlformats.org/presentationml/2006/main">
   <p:cSld>
@@ -13001,7 +13517,7 @@
         <p:spPr>
           <a:xfrm>
             <a:off x="6703982" y="6313336"/>
-            <a:ext cx="3297268" cy="369332"/>
+            <a:ext cx="3325843" cy="369332"/>
           </a:xfrm>
           <a:prstGeom prst="rect">
             <a:avLst/>
@@ -13057,7 +13573,7 @@
                   <a:schemeClr val="bg1"/>
                 </a:solidFill>
               </a:rPr>
-              <a:t>BREND</a:t>
+              <a:t>BERT</a:t>
             </a:r>
             <a:endParaRPr lang="LID4096" dirty="0">
               <a:solidFill>
@@ -13070,7 +13586,7 @@
     </p:spTree>
     <p:extLst>
       <p:ext uri="{BB962C8B-B14F-4D97-AF65-F5344CB8AC3E}">
-        <p14:creationId xmlns:p14="http://schemas.microsoft.com/office/powerpoint/2010/main" val="2538337335"/>
+        <p14:creationId xmlns:p14="http://schemas.microsoft.com/office/powerpoint/2010/main" val="3732158348"/>
       </p:ext>
     </p:extLst>
   </p:cSld>

</xml_diff>